<commit_message>
Addition of 2 equations in block diagram
</commit_message>
<xml_diff>
--- a/presentations/20200112-Project_kickoff_v3.pptx
+++ b/presentations/20200112-Project_kickoff_v3.pptx
@@ -291,7 +291,7 @@
               <a:pPr>
                 <a:defRPr/>
               </a:pPr>
-              <a:t>13/01/2020</a:t>
+              <a:t>14/01/2020</a:t>
             </a:fld>
             <a:endParaRPr lang="en-GB" dirty="0"/>
           </a:p>
@@ -510,7 +510,7 @@
               <a:pPr>
                 <a:defRPr/>
               </a:pPr>
-              <a:t>13/01/2020</a:t>
+              <a:t>14/01/2020</a:t>
             </a:fld>
             <a:endParaRPr lang="en-GB"/>
           </a:p>
@@ -13288,8 +13288,8 @@
             </a:fontRef>
           </p:style>
         </p:cxnSp>
-        <mc:AlternateContent xmlns:mc="http://schemas.openxmlformats.org/markup-compatibility/2006">
-          <mc:Choice xmlns:a14="http://schemas.microsoft.com/office/drawing/2010/main" Requires="a14">
+        <mc:AlternateContent xmlns:mc="http://schemas.openxmlformats.org/markup-compatibility/2006" xmlns:a14="http://schemas.microsoft.com/office/drawing/2010/main">
+          <mc:Choice Requires="a14">
             <p:sp>
               <p:nvSpPr>
                 <p:cNvPr id="49" name="Textfeld 48">
@@ -13364,7 +13364,7 @@
               </p:txBody>
             </p:sp>
           </mc:Choice>
-          <mc:Fallback>
+          <mc:Fallback xmlns="">
             <p:sp>
               <p:nvSpPr>
                 <p:cNvPr id="49" name="Textfeld 48">
@@ -13474,7 +13474,39 @@
                     <a:schemeClr val="tx1"/>
                   </a:solidFill>
                 </a:rPr>
-                <a:t>Forward kinematics </a:t>
+                <a:t>Forward </a:t>
+              </a:r>
+              <a:r>
+                <a:rPr lang="de-DE" sz="1200" dirty="0" err="1">
+                  <a:solidFill>
+                    <a:schemeClr val="tx1"/>
+                  </a:solidFill>
+                </a:rPr>
+                <a:t>ki-nematics</a:t>
+              </a:r>
+              <a:r>
+                <a:rPr lang="de-DE" sz="1200" dirty="0">
+                  <a:solidFill>
+                    <a:schemeClr val="tx1"/>
+                  </a:solidFill>
+                </a:rPr>
+                <a:t> </a:t>
+              </a:r>
+              <a:r>
+                <a:rPr lang="de-DE" sz="1200" baseline="30000" dirty="0">
+                  <a:solidFill>
+                    <a:schemeClr val="tx1"/>
+                  </a:solidFill>
+                </a:rPr>
+                <a:t>1)</a:t>
+              </a:r>
+              <a:r>
+                <a:rPr lang="de-DE" sz="1200" dirty="0">
+                  <a:solidFill>
+                    <a:schemeClr val="tx1"/>
+                  </a:solidFill>
+                </a:rPr>
+                <a:t> </a:t>
               </a:r>
             </a:p>
           </p:txBody>
@@ -13799,8 +13831,8 @@
             </p:style>
           </p:cxnSp>
         </p:grpSp>
-        <mc:AlternateContent xmlns:mc="http://schemas.openxmlformats.org/markup-compatibility/2006">
-          <mc:Choice xmlns:a14="http://schemas.microsoft.com/office/drawing/2010/main" Requires="a14">
+        <mc:AlternateContent xmlns:mc="http://schemas.openxmlformats.org/markup-compatibility/2006" xmlns:a14="http://schemas.microsoft.com/office/drawing/2010/main">
+          <mc:Choice Requires="a14">
             <p:sp>
               <p:nvSpPr>
                 <p:cNvPr id="100" name="Rechteck 99">
@@ -13907,7 +13939,7 @@
               </p:txBody>
             </p:sp>
           </mc:Choice>
-          <mc:Fallback>
+          <mc:Fallback xmlns="">
             <p:sp>
               <p:nvSpPr>
                 <p:cNvPr id="100" name="Rechteck 99">
@@ -14178,8 +14210,8 @@
             </a:fontRef>
           </p:style>
         </p:cxnSp>
-        <mc:AlternateContent xmlns:mc="http://schemas.openxmlformats.org/markup-compatibility/2006">
-          <mc:Choice xmlns:a14="http://schemas.microsoft.com/office/drawing/2010/main" Requires="a14">
+        <mc:AlternateContent xmlns:mc="http://schemas.openxmlformats.org/markup-compatibility/2006" xmlns:a14="http://schemas.microsoft.com/office/drawing/2010/main">
+          <mc:Choice Requires="a14">
             <p:sp>
               <p:nvSpPr>
                 <p:cNvPr id="160" name="Textfeld 159">
@@ -14247,7 +14279,7 @@
               </p:txBody>
             </p:sp>
           </mc:Choice>
-          <mc:Fallback>
+          <mc:Fallback xmlns="">
             <p:sp>
               <p:nvSpPr>
                 <p:cNvPr id="160" name="Textfeld 159">
@@ -14384,8 +14416,8 @@
             </a:fontRef>
           </p:style>
         </p:cxnSp>
-        <mc:AlternateContent xmlns:mc="http://schemas.openxmlformats.org/markup-compatibility/2006">
-          <mc:Choice xmlns:a14="http://schemas.microsoft.com/office/drawing/2010/main" Requires="a14">
+        <mc:AlternateContent xmlns:mc="http://schemas.openxmlformats.org/markup-compatibility/2006" xmlns:a14="http://schemas.microsoft.com/office/drawing/2010/main">
+          <mc:Choice Requires="a14">
             <p:sp>
               <p:nvSpPr>
                 <p:cNvPr id="190" name="Textfeld 189">
@@ -14456,7 +14488,7 @@
               </p:txBody>
             </p:sp>
           </mc:Choice>
-          <mc:Fallback>
+          <mc:Fallback xmlns="">
             <p:sp>
               <p:nvSpPr>
                 <p:cNvPr id="190" name="Textfeld 189">
@@ -15064,8 +15096,8 @@
             </p:nvSpPr>
             <p:spPr>
               <a:xfrm>
-                <a:off x="340172" y="5642644"/>
-                <a:ext cx="2332641" cy="726797"/>
+                <a:off x="340172" y="5255408"/>
+                <a:ext cx="2332641" cy="1114033"/>
               </a:xfrm>
               <a:prstGeom prst="rect">
                 <a:avLst/>
@@ -15095,17 +15127,350 @@
                   </a:rPr>
                   <a:t> </a:t>
                 </a:r>
+                <a14:m>
+                  <m:oMath xmlns:m="http://schemas.openxmlformats.org/officeDocument/2006/math">
+                    <m:d>
+                      <m:dPr>
+                        <m:begChr m:val="["/>
+                        <m:endChr m:val="]"/>
+                        <m:ctrlPr>
+                          <a:rPr lang="de-DE" sz="900" b="0" i="0" smtClean="0">
+                            <a:latin typeface="Cambria Math" panose="02040503050406030204" pitchFamily="18" charset="0"/>
+                          </a:rPr>
+                        </m:ctrlPr>
+                      </m:dPr>
+                      <m:e>
+                        <m:m>
+                          <m:mPr>
+                            <m:mcs>
+                              <m:mc>
+                                <m:mcPr>
+                                  <m:count m:val="1"/>
+                                  <m:mcJc m:val="center"/>
+                                </m:mcPr>
+                              </m:mc>
+                            </m:mcs>
+                            <m:ctrlPr>
+                              <a:rPr lang="de-DE" sz="900" b="0" i="1" smtClean="0">
+                                <a:latin typeface="Cambria Math" panose="02040503050406030204" pitchFamily="18" charset="0"/>
+                              </a:rPr>
+                            </m:ctrlPr>
+                          </m:mPr>
+                          <m:mr>
+                            <m:e>
+                              <m:acc>
+                                <m:accPr>
+                                  <m:chr m:val="̇"/>
+                                  <m:ctrlPr>
+                                    <a:rPr lang="de-DE" sz="900" i="1">
+                                      <a:latin typeface="Cambria Math" panose="02040503050406030204" pitchFamily="18" charset="0"/>
+                                    </a:rPr>
+                                  </m:ctrlPr>
+                                </m:accPr>
+                                <m:e>
+                                  <m:r>
+                                    <a:rPr lang="de-DE" sz="900" b="0" i="1" smtClean="0">
+                                      <a:latin typeface="Cambria Math" panose="02040503050406030204" pitchFamily="18" charset="0"/>
+                                    </a:rPr>
+                                    <m:t>𝑋</m:t>
+                                  </m:r>
+                                </m:e>
+                              </m:acc>
+                            </m:e>
+                          </m:mr>
+                          <m:mr>
+                            <m:e>
+                              <m:acc>
+                                <m:accPr>
+                                  <m:chr m:val="̇"/>
+                                  <m:ctrlPr>
+                                    <a:rPr lang="de-DE" sz="900" i="1">
+                                      <a:latin typeface="Cambria Math" panose="02040503050406030204" pitchFamily="18" charset="0"/>
+                                    </a:rPr>
+                                  </m:ctrlPr>
+                                </m:accPr>
+                                <m:e>
+                                  <m:r>
+                                    <m:rPr>
+                                      <m:sty m:val="p"/>
+                                    </m:rPr>
+                                    <a:rPr lang="de-DE" sz="900" b="0" i="0" smtClean="0">
+                                      <a:latin typeface="Cambria Math" panose="02040503050406030204" pitchFamily="18" charset="0"/>
+                                    </a:rPr>
+                                    <m:t>Θ</m:t>
+                                  </m:r>
+                                </m:e>
+                              </m:acc>
+                            </m:e>
+                          </m:mr>
+                        </m:m>
+                      </m:e>
+                    </m:d>
+                    <m:r>
+                      <a:rPr lang="de-DE" sz="900" b="0" i="1" smtClean="0">
+                        <a:latin typeface="Cambria Math" panose="02040503050406030204" pitchFamily="18" charset="0"/>
+                      </a:rPr>
+                      <m:t>=</m:t>
+                    </m:r>
+                    <m:r>
+                      <a:rPr lang="de-DE" sz="900" b="0" i="1" smtClean="0">
+                        <a:latin typeface="Cambria Math" panose="02040503050406030204" pitchFamily="18" charset="0"/>
+                      </a:rPr>
+                      <m:t>𝐽</m:t>
+                    </m:r>
+                    <m:r>
+                      <a:rPr lang="de-DE" sz="900" b="0" i="1" smtClean="0">
+                        <a:latin typeface="Cambria Math" panose="02040503050406030204" pitchFamily="18" charset="0"/>
+                        <a:ea typeface="Cambria Math" panose="02040503050406030204" pitchFamily="18" charset="0"/>
+                      </a:rPr>
+                      <m:t>∙</m:t>
+                    </m:r>
+                    <m:acc>
+                      <m:accPr>
+                        <m:chr m:val="̇"/>
+                        <m:ctrlPr>
+                          <a:rPr lang="de-DE" sz="900" i="1">
+                            <a:latin typeface="Cambria Math" panose="02040503050406030204" pitchFamily="18" charset="0"/>
+                          </a:rPr>
+                        </m:ctrlPr>
+                      </m:accPr>
+                      <m:e>
+                        <m:r>
+                          <a:rPr lang="de-DE" sz="900" i="1">
+                            <a:latin typeface="Cambria Math" panose="02040503050406030204" pitchFamily="18" charset="0"/>
+                          </a:rPr>
+                          <m:t>𝑄</m:t>
+                        </m:r>
+                      </m:e>
+                    </m:acc>
+                  </m:oMath>
+                </a14:m>
                 <a:r>
-                  <a:rPr lang="de-DE" sz="900" dirty="0" err="1">
+                  <a:rPr lang="de-DE" sz="900" dirty="0">
                     <a:latin typeface="+mn-lt"/>
                   </a:rPr>
-                  <a:t>Eq</a:t>
+                  <a:t>, </a:t>
+                </a:r>
+                <a14:m>
+                  <m:oMath xmlns:m="http://schemas.openxmlformats.org/officeDocument/2006/math">
+                    <m:d>
+                      <m:dPr>
+                        <m:begChr m:val="["/>
+                        <m:endChr m:val="]"/>
+                        <m:ctrlPr>
+                          <a:rPr lang="de-DE" sz="900" i="1">
+                            <a:latin typeface="Cambria Math" panose="02040503050406030204" pitchFamily="18" charset="0"/>
+                          </a:rPr>
+                        </m:ctrlPr>
+                      </m:dPr>
+                      <m:e>
+                        <m:m>
+                          <m:mPr>
+                            <m:mcs>
+                              <m:mc>
+                                <m:mcPr>
+                                  <m:count m:val="1"/>
+                                  <m:mcJc m:val="center"/>
+                                </m:mcPr>
+                              </m:mc>
+                            </m:mcs>
+                            <m:ctrlPr>
+                              <a:rPr lang="de-DE" sz="900" i="1">
+                                <a:latin typeface="Cambria Math" panose="02040503050406030204" pitchFamily="18" charset="0"/>
+                              </a:rPr>
+                            </m:ctrlPr>
+                          </m:mPr>
+                          <m:mr>
+                            <m:e>
+                              <m:acc>
+                                <m:accPr>
+                                  <m:chr m:val="̈"/>
+                                  <m:ctrlPr>
+                                    <a:rPr lang="de-DE" sz="900" i="1">
+                                      <a:latin typeface="Cambria Math" panose="02040503050406030204" pitchFamily="18" charset="0"/>
+                                    </a:rPr>
+                                  </m:ctrlPr>
+                                </m:accPr>
+                                <m:e>
+                                  <m:r>
+                                    <a:rPr lang="de-DE" sz="900" i="1">
+                                      <a:latin typeface="Cambria Math" panose="02040503050406030204" pitchFamily="18" charset="0"/>
+                                    </a:rPr>
+                                    <m:t>𝑋</m:t>
+                                  </m:r>
+                                </m:e>
+                              </m:acc>
+                            </m:e>
+                          </m:mr>
+                          <m:mr>
+                            <m:e>
+                              <m:acc>
+                                <m:accPr>
+                                  <m:chr m:val="̈"/>
+                                  <m:ctrlPr>
+                                    <a:rPr lang="de-DE" sz="900" i="1">
+                                      <a:latin typeface="Cambria Math" panose="02040503050406030204" pitchFamily="18" charset="0"/>
+                                    </a:rPr>
+                                  </m:ctrlPr>
+                                </m:accPr>
+                                <m:e>
+                                  <m:r>
+                                    <m:rPr>
+                                      <m:sty m:val="p"/>
+                                    </m:rPr>
+                                    <a:rPr lang="de-DE" sz="900" b="0" i="0" smtClean="0">
+                                      <a:latin typeface="Cambria Math" panose="02040503050406030204" pitchFamily="18" charset="0"/>
+                                    </a:rPr>
+                                    <m:t>Θ</m:t>
+                                  </m:r>
+                                </m:e>
+                              </m:acc>
+                            </m:e>
+                          </m:mr>
+                        </m:m>
+                      </m:e>
+                    </m:d>
+                    <m:r>
+                      <a:rPr lang="de-DE" sz="900" i="1">
+                        <a:latin typeface="Cambria Math" panose="02040503050406030204" pitchFamily="18" charset="0"/>
+                      </a:rPr>
+                      <m:t>=</m:t>
+                    </m:r>
+                    <m:r>
+                      <a:rPr lang="de-DE" sz="900" i="1">
+                        <a:latin typeface="Cambria Math" panose="02040503050406030204" pitchFamily="18" charset="0"/>
+                      </a:rPr>
+                      <m:t>𝐽</m:t>
+                    </m:r>
+                    <m:r>
+                      <a:rPr lang="de-DE" sz="900" i="1">
+                        <a:latin typeface="Cambria Math" panose="02040503050406030204" pitchFamily="18" charset="0"/>
+                        <a:ea typeface="Cambria Math" panose="02040503050406030204" pitchFamily="18" charset="0"/>
+                      </a:rPr>
+                      <m:t>∙</m:t>
+                    </m:r>
+                    <m:acc>
+                      <m:accPr>
+                        <m:chr m:val="̈"/>
+                        <m:ctrlPr>
+                          <a:rPr lang="de-DE" sz="900" i="1">
+                            <a:latin typeface="Cambria Math" panose="02040503050406030204" pitchFamily="18" charset="0"/>
+                          </a:rPr>
+                        </m:ctrlPr>
+                      </m:accPr>
+                      <m:e>
+                        <m:r>
+                          <a:rPr lang="de-DE" sz="900" i="1">
+                            <a:latin typeface="Cambria Math" panose="02040503050406030204" pitchFamily="18" charset="0"/>
+                          </a:rPr>
+                          <m:t>𝑄</m:t>
+                        </m:r>
+                      </m:e>
+                    </m:acc>
+                    <m:r>
+                      <a:rPr lang="de-DE" sz="900" b="0" i="1" smtClean="0">
+                        <a:latin typeface="Cambria Math" panose="02040503050406030204" pitchFamily="18" charset="0"/>
+                      </a:rPr>
+                      <m:t>+</m:t>
+                    </m:r>
+                    <m:sSup>
+                      <m:sSupPr>
+                        <m:ctrlPr>
+                          <a:rPr lang="de-DE" sz="900" b="0" i="1" smtClean="0">
+                            <a:latin typeface="Cambria Math" panose="02040503050406030204" pitchFamily="18" charset="0"/>
+                          </a:rPr>
+                        </m:ctrlPr>
+                      </m:sSupPr>
+                      <m:e>
+                        <m:acc>
+                          <m:accPr>
+                            <m:chr m:val="̇"/>
+                            <m:ctrlPr>
+                              <a:rPr lang="de-DE" sz="900" i="1">
+                                <a:latin typeface="Cambria Math" panose="02040503050406030204" pitchFamily="18" charset="0"/>
+                              </a:rPr>
+                            </m:ctrlPr>
+                          </m:accPr>
+                          <m:e>
+                            <m:r>
+                              <a:rPr lang="de-DE" sz="900" i="1">
+                                <a:latin typeface="Cambria Math" panose="02040503050406030204" pitchFamily="18" charset="0"/>
+                              </a:rPr>
+                              <m:t>𝑄</m:t>
+                            </m:r>
+                          </m:e>
+                        </m:acc>
+                      </m:e>
+                      <m:sup>
+                        <m:r>
+                          <a:rPr lang="de-DE" sz="900" b="0" i="1" smtClean="0">
+                            <a:latin typeface="Cambria Math" panose="02040503050406030204" pitchFamily="18" charset="0"/>
+                          </a:rPr>
+                          <m:t>𝑇</m:t>
+                        </m:r>
+                      </m:sup>
+                    </m:sSup>
+                    <m:r>
+                      <a:rPr lang="de-DE" sz="900" b="0" i="1" smtClean="0">
+                        <a:latin typeface="Cambria Math" panose="02040503050406030204" pitchFamily="18" charset="0"/>
+                        <a:ea typeface="Cambria Math" panose="02040503050406030204" pitchFamily="18" charset="0"/>
+                      </a:rPr>
+                      <m:t>∙</m:t>
+                    </m:r>
+                    <m:r>
+                      <a:rPr lang="de-DE" sz="900" b="0" i="1" smtClean="0">
+                        <a:latin typeface="Cambria Math" panose="02040503050406030204" pitchFamily="18" charset="0"/>
+                      </a:rPr>
+                      <m:t>𝐻</m:t>
+                    </m:r>
+                    <m:r>
+                      <a:rPr lang="de-DE" sz="900" b="0" i="1" smtClean="0">
+                        <a:latin typeface="Cambria Math" panose="02040503050406030204" pitchFamily="18" charset="0"/>
+                        <a:ea typeface="Cambria Math" panose="02040503050406030204" pitchFamily="18" charset="0"/>
+                      </a:rPr>
+                      <m:t>∙</m:t>
+                    </m:r>
+                    <m:acc>
+                      <m:accPr>
+                        <m:chr m:val="̇"/>
+                        <m:ctrlPr>
+                          <a:rPr lang="de-DE" sz="900" i="1">
+                            <a:latin typeface="Cambria Math" panose="02040503050406030204" pitchFamily="18" charset="0"/>
+                          </a:rPr>
+                        </m:ctrlPr>
+                      </m:accPr>
+                      <m:e>
+                        <m:r>
+                          <a:rPr lang="de-DE" sz="900" i="1">
+                            <a:latin typeface="Cambria Math" panose="02040503050406030204" pitchFamily="18" charset="0"/>
+                          </a:rPr>
+                          <m:t>𝑄</m:t>
+                        </m:r>
+                      </m:e>
+                    </m:acc>
+                  </m:oMath>
+                </a14:m>
+                <a:endParaRPr lang="de-DE" sz="900" dirty="0">
+                  <a:latin typeface="+mn-lt"/>
+                </a:endParaRPr>
+              </a:p>
+              <a:p>
+                <a:pPr>
+                  <a:lnSpc>
+                    <a:spcPct val="114000"/>
+                  </a:lnSpc>
+                </a:pPr>
+                <a:r>
+                  <a:rPr lang="de-DE" sz="900" baseline="30000" dirty="0">
+                    <a:latin typeface="+mn-lt"/>
+                  </a:rPr>
+                  <a:t>2)</a:t>
                 </a:r>
                 <a:r>
                   <a:rPr lang="de-DE" sz="900" dirty="0">
                     <a:latin typeface="+mn-lt"/>
                   </a:rPr>
-                  <a:t>.: </a:t>
+                  <a:t> </a:t>
                 </a:r>
                 <a14:m>
                   <m:oMath xmlns:m="http://schemas.openxmlformats.org/officeDocument/2006/math">
@@ -15572,7 +15937,7 @@
                   <a:rPr lang="de-DE" sz="900" dirty="0">
                     <a:latin typeface="+mn-lt"/>
                   </a:rPr>
-                  <a:t>           </a:t>
+                  <a:t>   </a:t>
                 </a:r>
                 <a14:m>
                   <m:oMath xmlns:m="http://schemas.openxmlformats.org/officeDocument/2006/math">
@@ -16123,8 +16488,8 @@
             </p:nvSpPr>
             <p:spPr>
               <a:xfrm>
-                <a:off x="340172" y="5642644"/>
-                <a:ext cx="2332641" cy="726797"/>
+                <a:off x="340172" y="5255408"/>
+                <a:ext cx="2332641" cy="1114033"/>
               </a:xfrm>
               <a:prstGeom prst="rect">
                 <a:avLst/>
@@ -16132,7 +16497,7 @@
               <a:blipFill>
                 <a:blip r:embed="rId35"/>
                 <a:stretch>
-                  <a:fillRect l="-2356" t="-30252" r="-3141"/>
+                  <a:fillRect l="-2356"/>
                 </a:stretch>
               </a:blipFill>
             </p:spPr>
@@ -16281,8 +16646,8 @@
               <a:chExt cx="7346853" cy="2710087"/>
             </a:xfrm>
           </p:grpSpPr>
-          <mc:AlternateContent xmlns:mc="http://schemas.openxmlformats.org/markup-compatibility/2006">
-            <mc:Choice xmlns:a14="http://schemas.microsoft.com/office/drawing/2010/main" Requires="a14">
+          <mc:AlternateContent xmlns:mc="http://schemas.openxmlformats.org/markup-compatibility/2006" xmlns:a14="http://schemas.microsoft.com/office/drawing/2010/main">
+            <mc:Choice Requires="a14">
               <p:sp>
                 <p:nvSpPr>
                   <p:cNvPr id="286" name="Textfeld 285">
@@ -16338,7 +16703,7 @@
                 </p:txBody>
               </p:sp>
             </mc:Choice>
-            <mc:Fallback>
+            <mc:Fallback xmlns="">
               <p:sp>
                 <p:nvSpPr>
                   <p:cNvPr id="286" name="Textfeld 285">
@@ -16495,8 +16860,8 @@
                 </a:fontRef>
               </p:style>
             </p:cxnSp>
-            <mc:AlternateContent xmlns:mc="http://schemas.openxmlformats.org/markup-compatibility/2006">
-              <mc:Choice xmlns:a14="http://schemas.microsoft.com/office/drawing/2010/main" Requires="a14">
+            <mc:AlternateContent xmlns:mc="http://schemas.openxmlformats.org/markup-compatibility/2006" xmlns:a14="http://schemas.microsoft.com/office/drawing/2010/main">
+              <mc:Choice Requires="a14">
                 <p:sp>
                   <p:nvSpPr>
                     <p:cNvPr id="344" name="Rechteck 343">
@@ -16603,7 +16968,7 @@
                   </p:txBody>
                 </p:sp>
               </mc:Choice>
-              <mc:Fallback>
+              <mc:Fallback xmlns="">
                 <p:sp>
                   <p:nvSpPr>
                     <p:cNvPr id="344" name="Rechteck 343">
@@ -16839,8 +17204,8 @@
                 </mc:Fallback>
               </mc:AlternateContent>
             </p:grpSp>
-            <mc:AlternateContent xmlns:mc="http://schemas.openxmlformats.org/markup-compatibility/2006">
-              <mc:Choice xmlns:a14="http://schemas.microsoft.com/office/drawing/2010/main" Requires="a14">
+            <mc:AlternateContent xmlns:mc="http://schemas.openxmlformats.org/markup-compatibility/2006" xmlns:a14="http://schemas.microsoft.com/office/drawing/2010/main">
+              <mc:Choice Requires="a14">
                 <p:sp>
                   <p:nvSpPr>
                     <p:cNvPr id="39" name="Rechteck 38">
@@ -17286,7 +17651,7 @@
                   </p:txBody>
                 </p:sp>
               </mc:Choice>
-              <mc:Fallback>
+              <mc:Fallback xmlns="">
                 <p:sp>
                   <p:nvSpPr>
                     <p:cNvPr id="39" name="Rechteck 38">
@@ -17733,8 +18098,8 @@
                 </mc:Fallback>
               </mc:AlternateContent>
             </p:grpSp>
-            <mc:AlternateContent xmlns:mc="http://schemas.openxmlformats.org/markup-compatibility/2006">
-              <mc:Choice xmlns:a14="http://schemas.microsoft.com/office/drawing/2010/main" Requires="a14">
+            <mc:AlternateContent xmlns:mc="http://schemas.openxmlformats.org/markup-compatibility/2006" xmlns:a14="http://schemas.microsoft.com/office/drawing/2010/main">
+              <mc:Choice Requires="a14">
                 <p:sp>
                   <p:nvSpPr>
                     <p:cNvPr id="122" name="Rechteck 121">
@@ -17841,7 +18206,7 @@
                   </p:txBody>
                 </p:sp>
               </mc:Choice>
-              <mc:Fallback>
+              <mc:Fallback xmlns="">
                 <p:sp>
                   <p:nvSpPr>
                     <p:cNvPr id="122" name="Rechteck 121">
@@ -17889,8 +18254,8 @@
                 </p:sp>
               </mc:Fallback>
             </mc:AlternateContent>
-            <mc:AlternateContent xmlns:mc="http://schemas.openxmlformats.org/markup-compatibility/2006">
-              <mc:Choice xmlns:a14="http://schemas.microsoft.com/office/drawing/2010/main" Requires="a14">
+            <mc:AlternateContent xmlns:mc="http://schemas.openxmlformats.org/markup-compatibility/2006" xmlns:a14="http://schemas.microsoft.com/office/drawing/2010/main">
+              <mc:Choice Requires="a14">
                 <p:sp>
                   <p:nvSpPr>
                     <p:cNvPr id="123" name="Rechteck 122">
@@ -17997,7 +18362,7 @@
                   </p:txBody>
                 </p:sp>
               </mc:Choice>
-              <mc:Fallback>
+              <mc:Fallback xmlns="">
                 <p:sp>
                   <p:nvSpPr>
                     <p:cNvPr id="123" name="Rechteck 122">
@@ -18429,8 +18794,8 @@
                 </mc:Fallback>
               </mc:AlternateContent>
             </p:grpSp>
-            <mc:AlternateContent xmlns:mc="http://schemas.openxmlformats.org/markup-compatibility/2006">
-              <mc:Choice xmlns:a14="http://schemas.microsoft.com/office/drawing/2010/main" Requires="a14">
+            <mc:AlternateContent xmlns:mc="http://schemas.openxmlformats.org/markup-compatibility/2006" xmlns:a14="http://schemas.microsoft.com/office/drawing/2010/main">
+              <mc:Choice Requires="a14">
                 <p:sp>
                   <p:nvSpPr>
                     <p:cNvPr id="136" name="Rechteck 135">
@@ -18537,7 +18902,7 @@
                   </p:txBody>
                 </p:sp>
               </mc:Choice>
-              <mc:Fallback>
+              <mc:Fallback xmlns="">
                 <p:sp>
                   <p:nvSpPr>
                     <p:cNvPr id="136" name="Rechteck 135">
@@ -18585,8 +18950,8 @@
                 </p:sp>
               </mc:Fallback>
             </mc:AlternateContent>
-            <mc:AlternateContent xmlns:mc="http://schemas.openxmlformats.org/markup-compatibility/2006">
-              <mc:Choice xmlns:a14="http://schemas.microsoft.com/office/drawing/2010/main" Requires="a14">
+            <mc:AlternateContent xmlns:mc="http://schemas.openxmlformats.org/markup-compatibility/2006" xmlns:a14="http://schemas.microsoft.com/office/drawing/2010/main">
+              <mc:Choice Requires="a14">
                 <p:sp>
                   <p:nvSpPr>
                     <p:cNvPr id="137" name="Rechteck 136">
@@ -18693,7 +19058,7 @@
                   </p:txBody>
                 </p:sp>
               </mc:Choice>
-              <mc:Fallback>
+              <mc:Fallback xmlns="">
                 <p:sp>
                   <p:nvSpPr>
                     <p:cNvPr id="137" name="Rechteck 136">
@@ -21141,7 +21506,7 @@
                             <a:schemeClr val="tx1"/>
                           </a:solidFill>
                         </a:rPr>
-                        <a:t>1)</a:t>
+                        <a:t>2)</a:t>
                       </a:r>
                     </a:p>
                     <a:p>
@@ -21567,8 +21932,8 @@
                 </a:fontRef>
               </p:style>
             </p:cxnSp>
-            <mc:AlternateContent xmlns:mc="http://schemas.openxmlformats.org/markup-compatibility/2006">
-              <mc:Choice xmlns:a14="http://schemas.microsoft.com/office/drawing/2010/main" Requires="a14">
+            <mc:AlternateContent xmlns:mc="http://schemas.openxmlformats.org/markup-compatibility/2006" xmlns:a14="http://schemas.microsoft.com/office/drawing/2010/main">
+              <mc:Choice Requires="a14">
                 <p:sp>
                   <p:nvSpPr>
                     <p:cNvPr id="404" name="Rechteck 403">
@@ -21675,7 +22040,7 @@
                   </p:txBody>
                 </p:sp>
               </mc:Choice>
-              <mc:Fallback>
+              <mc:Fallback xmlns="">
                 <p:sp>
                   <p:nvSpPr>
                     <p:cNvPr id="404" name="Rechteck 403">
@@ -22723,8 +23088,8 @@
             </a:p>
           </p:txBody>
         </p:sp>
-        <mc:AlternateContent xmlns:mc="http://schemas.openxmlformats.org/markup-compatibility/2006">
-          <mc:Choice xmlns:a14="http://schemas.microsoft.com/office/drawing/2010/main" Requires="a14">
+        <mc:AlternateContent xmlns:mc="http://schemas.openxmlformats.org/markup-compatibility/2006" xmlns:a14="http://schemas.microsoft.com/office/drawing/2010/main">
+          <mc:Choice Requires="a14">
             <p:sp>
               <p:nvSpPr>
                 <p:cNvPr id="496" name="Rechteck 495">
@@ -23106,7 +23471,7 @@
               </p:txBody>
             </p:sp>
           </mc:Choice>
-          <mc:Fallback>
+          <mc:Fallback xmlns="">
             <p:sp>
               <p:nvSpPr>
                 <p:cNvPr id="496" name="Rechteck 495">
@@ -23154,8 +23519,8 @@
             </p:sp>
           </mc:Fallback>
         </mc:AlternateContent>
-        <mc:AlternateContent xmlns:mc="http://schemas.openxmlformats.org/markup-compatibility/2006">
-          <mc:Choice xmlns:a14="http://schemas.microsoft.com/office/drawing/2010/main" Requires="a14">
+        <mc:AlternateContent xmlns:mc="http://schemas.openxmlformats.org/markup-compatibility/2006" xmlns:a14="http://schemas.microsoft.com/office/drawing/2010/main">
+          <mc:Choice Requires="a14">
             <p:sp>
               <p:nvSpPr>
                 <p:cNvPr id="514" name="Textfeld 513">
@@ -23230,7 +23595,7 @@
               </p:txBody>
             </p:sp>
           </mc:Choice>
-          <mc:Fallback>
+          <mc:Fallback xmlns="">
             <p:sp>
               <p:nvSpPr>
                 <p:cNvPr id="514" name="Textfeld 513">
@@ -26684,8 +27049,8 @@
             <a:chExt cx="3864511" cy="1115180"/>
           </a:xfrm>
         </p:grpSpPr>
-        <mc:AlternateContent xmlns:mc="http://schemas.openxmlformats.org/markup-compatibility/2006">
-          <mc:Choice xmlns:a14="http://schemas.microsoft.com/office/drawing/2010/main" Requires="a14">
+        <mc:AlternateContent xmlns:mc="http://schemas.openxmlformats.org/markup-compatibility/2006" xmlns:a14="http://schemas.microsoft.com/office/drawing/2010/main">
+          <mc:Choice Requires="a14">
             <p:sp>
               <p:nvSpPr>
                 <p:cNvPr id="9" name="Textfeld 8">
@@ -26746,7 +27111,13 @@
                               <a:rPr lang="de-DE" sz="1200" b="0" i="1" smtClean="0">
                                 <a:latin typeface="Cambria Math" panose="02040503050406030204" pitchFamily="18" charset="0"/>
                               </a:rPr>
-                              <m:t>𝑇𝑒𝑎𝑐h</m:t>
+                              <m:t>𝑇𝑒𝑎𝑐</m:t>
+                            </m:r>
+                            <m:r>
+                              <a:rPr lang="de-DE" sz="1200" b="0" i="1" smtClean="0">
+                                <a:latin typeface="Cambria Math" panose="02040503050406030204" pitchFamily="18" charset="0"/>
+                              </a:rPr>
+                              <m:t>h</m:t>
                             </m:r>
                           </m:sub>
                         </m:sSub>
@@ -26760,7 +27131,7 @@
               </p:txBody>
             </p:sp>
           </mc:Choice>
-          <mc:Fallback>
+          <mc:Fallback xmlns="">
             <p:sp>
               <p:nvSpPr>
                 <p:cNvPr id="9" name="Textfeld 8">
@@ -26849,8 +27220,8 @@
             </a:fontRef>
           </p:style>
         </p:cxnSp>
-        <mc:AlternateContent xmlns:mc="http://schemas.openxmlformats.org/markup-compatibility/2006">
-          <mc:Choice xmlns:a14="http://schemas.microsoft.com/office/drawing/2010/main" Requires="a14">
+        <mc:AlternateContent xmlns:mc="http://schemas.openxmlformats.org/markup-compatibility/2006" xmlns:a14="http://schemas.microsoft.com/office/drawing/2010/main">
+          <mc:Choice Requires="a14">
             <p:sp>
               <p:nvSpPr>
                 <p:cNvPr id="13" name="Textfeld 12">
@@ -26937,7 +27308,7 @@
               </p:txBody>
             </p:sp>
           </mc:Choice>
-          <mc:Fallback>
+          <mc:Fallback xmlns="">
             <p:sp>
               <p:nvSpPr>
                 <p:cNvPr id="13" name="Textfeld 12">
@@ -26982,8 +27353,8 @@
             </p:sp>
           </mc:Fallback>
         </mc:AlternateContent>
-        <mc:AlternateContent xmlns:mc="http://schemas.openxmlformats.org/markup-compatibility/2006">
-          <mc:Choice xmlns:a14="http://schemas.microsoft.com/office/drawing/2010/main" Requires="a14">
+        <mc:AlternateContent xmlns:mc="http://schemas.openxmlformats.org/markup-compatibility/2006" xmlns:a14="http://schemas.microsoft.com/office/drawing/2010/main">
+          <mc:Choice Requires="a14">
             <p:sp>
               <p:nvSpPr>
                 <p:cNvPr id="15" name="Textfeld 14">
@@ -27073,7 +27444,7 @@
               </p:txBody>
             </p:sp>
           </mc:Choice>
-          <mc:Fallback>
+          <mc:Fallback xmlns="">
             <p:sp>
               <p:nvSpPr>
                 <p:cNvPr id="15" name="Textfeld 14">
@@ -27118,8 +27489,8 @@
             </p:sp>
           </mc:Fallback>
         </mc:AlternateContent>
-        <mc:AlternateContent xmlns:mc="http://schemas.openxmlformats.org/markup-compatibility/2006">
-          <mc:Choice xmlns:a14="http://schemas.microsoft.com/office/drawing/2010/main" Requires="a14">
+        <mc:AlternateContent xmlns:mc="http://schemas.openxmlformats.org/markup-compatibility/2006" xmlns:a14="http://schemas.microsoft.com/office/drawing/2010/main">
+          <mc:Choice Requires="a14">
             <p:sp>
               <p:nvSpPr>
                 <p:cNvPr id="19" name="Textfeld 18">
@@ -27175,7 +27546,7 @@
               </p:txBody>
             </p:sp>
           </mc:Choice>
-          <mc:Fallback>
+          <mc:Fallback xmlns="">
             <p:sp>
               <p:nvSpPr>
                 <p:cNvPr id="19" name="Textfeld 18">
@@ -27220,8 +27591,8 @@
             </p:sp>
           </mc:Fallback>
         </mc:AlternateContent>
-        <mc:AlternateContent xmlns:mc="http://schemas.openxmlformats.org/markup-compatibility/2006">
-          <mc:Choice xmlns:a14="http://schemas.microsoft.com/office/drawing/2010/main" Requires="a14">
+        <mc:AlternateContent xmlns:mc="http://schemas.openxmlformats.org/markup-compatibility/2006" xmlns:a14="http://schemas.microsoft.com/office/drawing/2010/main">
+          <mc:Choice Requires="a14">
             <p:sp>
               <p:nvSpPr>
                 <p:cNvPr id="21" name="Textfeld 20">
@@ -27289,7 +27660,7 @@
               </p:txBody>
             </p:sp>
           </mc:Choice>
-          <mc:Fallback>
+          <mc:Fallback xmlns="">
             <p:sp>
               <p:nvSpPr>
                 <p:cNvPr id="21" name="Textfeld 20">
@@ -27334,8 +27705,8 @@
             </p:sp>
           </mc:Fallback>
         </mc:AlternateContent>
-        <mc:AlternateContent xmlns:mc="http://schemas.openxmlformats.org/markup-compatibility/2006">
-          <mc:Choice xmlns:a14="http://schemas.microsoft.com/office/drawing/2010/main" Requires="a14">
+        <mc:AlternateContent xmlns:mc="http://schemas.openxmlformats.org/markup-compatibility/2006" xmlns:a14="http://schemas.microsoft.com/office/drawing/2010/main">
+          <mc:Choice Requires="a14">
             <p:sp>
               <p:nvSpPr>
                 <p:cNvPr id="24" name="Rechteck 23">
@@ -27663,7 +28034,16 @@
                                 </a:solidFill>
                                 <a:latin typeface="Cambria Math" panose="02040503050406030204" pitchFamily="18" charset="0"/>
                               </a:rPr>
-                              <m:t>−1</m:t>
+                              <m:t>−</m:t>
+                            </m:r>
+                            <m:r>
+                              <a:rPr lang="de-DE" sz="1000" b="0" i="1" smtClean="0">
+                                <a:solidFill>
+                                  <a:schemeClr val="tx1"/>
+                                </a:solidFill>
+                                <a:latin typeface="Cambria Math" panose="02040503050406030204" pitchFamily="18" charset="0"/>
+                              </a:rPr>
+                              <m:t>1</m:t>
                             </m:r>
                           </m:sup>
                         </m:sSup>
@@ -27758,7 +28138,7 @@
               </p:txBody>
             </p:sp>
           </mc:Choice>
-          <mc:Fallback>
+          <mc:Fallback xmlns="">
             <p:sp>
               <p:nvSpPr>
                 <p:cNvPr id="24" name="Rechteck 23">
@@ -28004,8 +28384,8 @@
             <a:chExt cx="3864510" cy="1539664"/>
           </a:xfrm>
         </p:grpSpPr>
-        <mc:AlternateContent xmlns:mc="http://schemas.openxmlformats.org/markup-compatibility/2006">
-          <mc:Choice xmlns:a14="http://schemas.microsoft.com/office/drawing/2010/main" Requires="a14">
+        <mc:AlternateContent xmlns:mc="http://schemas.openxmlformats.org/markup-compatibility/2006" xmlns:a14="http://schemas.microsoft.com/office/drawing/2010/main">
+          <mc:Choice Requires="a14">
             <p:sp>
               <p:nvSpPr>
                 <p:cNvPr id="11" name="Textfeld 10">
@@ -28080,7 +28460,7 @@
               </p:txBody>
             </p:sp>
           </mc:Choice>
-          <mc:Fallback>
+          <mc:Fallback xmlns="">
             <p:sp>
               <p:nvSpPr>
                 <p:cNvPr id="11" name="Textfeld 10">
@@ -28125,8 +28505,8 @@
             </p:sp>
           </mc:Fallback>
         </mc:AlternateContent>
-        <mc:AlternateContent xmlns:mc="http://schemas.openxmlformats.org/markup-compatibility/2006">
-          <mc:Choice xmlns:a14="http://schemas.microsoft.com/office/drawing/2010/main" Requires="a14">
+        <mc:AlternateContent xmlns:mc="http://schemas.openxmlformats.org/markup-compatibility/2006" xmlns:a14="http://schemas.microsoft.com/office/drawing/2010/main">
+          <mc:Choice Requires="a14">
             <p:sp>
               <p:nvSpPr>
                 <p:cNvPr id="17" name="Textfeld 16">
@@ -28182,7 +28562,7 @@
               </p:txBody>
             </p:sp>
           </mc:Choice>
-          <mc:Fallback>
+          <mc:Fallback xmlns="">
             <p:sp>
               <p:nvSpPr>
                 <p:cNvPr id="17" name="Textfeld 16">
@@ -28227,8 +28607,8 @@
             </p:sp>
           </mc:Fallback>
         </mc:AlternateContent>
-        <mc:AlternateContent xmlns:mc="http://schemas.openxmlformats.org/markup-compatibility/2006">
-          <mc:Choice xmlns:a14="http://schemas.microsoft.com/office/drawing/2010/main" Requires="a14">
+        <mc:AlternateContent xmlns:mc="http://schemas.openxmlformats.org/markup-compatibility/2006" xmlns:a14="http://schemas.microsoft.com/office/drawing/2010/main">
+          <mc:Choice Requires="a14">
             <p:sp>
               <p:nvSpPr>
                 <p:cNvPr id="33" name="Rechteck 32">
@@ -28502,7 +28882,7 @@
               </p:txBody>
             </p:sp>
           </mc:Choice>
-          <mc:Fallback>
+          <mc:Fallback xmlns="">
             <p:sp>
               <p:nvSpPr>
                 <p:cNvPr id="33" name="Rechteck 32">
@@ -28728,8 +29108,8 @@
             </a:fontRef>
           </p:style>
         </p:cxnSp>
-        <mc:AlternateContent xmlns:mc="http://schemas.openxmlformats.org/markup-compatibility/2006">
-          <mc:Choice xmlns:a14="http://schemas.microsoft.com/office/drawing/2010/main" Requires="a14">
+        <mc:AlternateContent xmlns:mc="http://schemas.openxmlformats.org/markup-compatibility/2006" xmlns:a14="http://schemas.microsoft.com/office/drawing/2010/main">
+          <mc:Choice Requires="a14">
             <p:sp>
               <p:nvSpPr>
                 <p:cNvPr id="56" name="Textfeld 55">
@@ -28804,7 +29184,7 @@
               </p:txBody>
             </p:sp>
           </mc:Choice>
-          <mc:Fallback>
+          <mc:Fallback xmlns="">
             <p:sp>
               <p:nvSpPr>
                 <p:cNvPr id="56" name="Textfeld 55">
@@ -28962,8 +29342,8 @@
             </a:fontRef>
           </p:style>
         </p:cxnSp>
-        <mc:AlternateContent xmlns:mc="http://schemas.openxmlformats.org/markup-compatibility/2006">
-          <mc:Choice xmlns:a14="http://schemas.microsoft.com/office/drawing/2010/main" Requires="a14">
+        <mc:AlternateContent xmlns:mc="http://schemas.openxmlformats.org/markup-compatibility/2006" xmlns:a14="http://schemas.microsoft.com/office/drawing/2010/main">
+          <mc:Choice Requires="a14">
             <p:sp>
               <p:nvSpPr>
                 <p:cNvPr id="32" name="Textfeld 31">
@@ -29038,7 +29418,7 @@
               </p:txBody>
             </p:sp>
           </mc:Choice>
-          <mc:Fallback>
+          <mc:Fallback xmlns="">
             <p:sp>
               <p:nvSpPr>
                 <p:cNvPr id="32" name="Textfeld 31">
@@ -29083,8 +29463,8 @@
             </p:sp>
           </mc:Fallback>
         </mc:AlternateContent>
-        <mc:AlternateContent xmlns:mc="http://schemas.openxmlformats.org/markup-compatibility/2006">
-          <mc:Choice xmlns:a14="http://schemas.microsoft.com/office/drawing/2010/main" Requires="a14">
+        <mc:AlternateContent xmlns:mc="http://schemas.openxmlformats.org/markup-compatibility/2006" xmlns:a14="http://schemas.microsoft.com/office/drawing/2010/main">
+          <mc:Choice Requires="a14">
             <p:sp>
               <p:nvSpPr>
                 <p:cNvPr id="58" name="Rechteck 57">
@@ -29414,7 +29794,16 @@
                                 </a:solidFill>
                                 <a:latin typeface="Cambria Math" panose="02040503050406030204" pitchFamily="18" charset="0"/>
                               </a:rPr>
-                              <m:t>−1</m:t>
+                              <m:t>−</m:t>
+                            </m:r>
+                            <m:r>
+                              <a:rPr lang="de-DE" sz="1000" b="0" i="1" smtClean="0">
+                                <a:solidFill>
+                                  <a:schemeClr val="tx1"/>
+                                </a:solidFill>
+                                <a:latin typeface="Cambria Math" panose="02040503050406030204" pitchFamily="18" charset="0"/>
+                              </a:rPr>
+                              <m:t>1</m:t>
                             </m:r>
                           </m:sup>
                         </m:sSup>
@@ -29509,7 +29898,7 @@
               </p:txBody>
             </p:sp>
           </mc:Choice>
-          <mc:Fallback>
+          <mc:Fallback xmlns="">
             <p:sp>
               <p:nvSpPr>
                 <p:cNvPr id="58" name="Rechteck 57">
@@ -29602,8 +29991,8 @@
             </a:fontRef>
           </p:style>
         </p:cxnSp>
-        <mc:AlternateContent xmlns:mc="http://schemas.openxmlformats.org/markup-compatibility/2006">
-          <mc:Choice xmlns:a14="http://schemas.microsoft.com/office/drawing/2010/main" Requires="a14">
+        <mc:AlternateContent xmlns:mc="http://schemas.openxmlformats.org/markup-compatibility/2006" xmlns:a14="http://schemas.microsoft.com/office/drawing/2010/main">
+          <mc:Choice Requires="a14">
             <p:sp>
               <p:nvSpPr>
                 <p:cNvPr id="72" name="Textfeld 71">
@@ -29659,7 +30048,7 @@
               </p:txBody>
             </p:sp>
           </mc:Choice>
-          <mc:Fallback>
+          <mc:Fallback xmlns="">
             <p:sp>
               <p:nvSpPr>
                 <p:cNvPr id="72" name="Textfeld 71">

</xml_diff>